<commit_message>
ppt banking application , C.Priyadharshini
</commit_message>
<xml_diff>
--- a/Mini_Project/Mini_Project Banking Application(C Priyadharshini).pptx
+++ b/Mini_Project/Mini_Project Banking Application(C Priyadharshini).pptx
@@ -5,7 +5,7 @@
     <p:sldMasterId id="2147483936" r:id="rId1"/>
   </p:sldMasterIdLst>
   <p:notesMasterIdLst>
-    <p:notesMasterId r:id="rId29"/>
+    <p:notesMasterId r:id="rId30"/>
   </p:notesMasterIdLst>
   <p:sldIdLst>
     <p:sldId id="256" r:id="rId2"/>
@@ -22,19 +22,20 @@
     <p:sldId id="287" r:id="rId13"/>
     <p:sldId id="288" r:id="rId14"/>
     <p:sldId id="278" r:id="rId15"/>
-    <p:sldId id="290" r:id="rId16"/>
-    <p:sldId id="291" r:id="rId17"/>
-    <p:sldId id="270" r:id="rId18"/>
-    <p:sldId id="271" r:id="rId19"/>
-    <p:sldId id="272" r:id="rId20"/>
-    <p:sldId id="273" r:id="rId21"/>
-    <p:sldId id="274" r:id="rId22"/>
-    <p:sldId id="275" r:id="rId23"/>
-    <p:sldId id="276" r:id="rId24"/>
-    <p:sldId id="289" r:id="rId25"/>
-    <p:sldId id="293" r:id="rId26"/>
-    <p:sldId id="292" r:id="rId27"/>
-    <p:sldId id="263" r:id="rId28"/>
+    <p:sldId id="294" r:id="rId16"/>
+    <p:sldId id="290" r:id="rId17"/>
+    <p:sldId id="291" r:id="rId18"/>
+    <p:sldId id="270" r:id="rId19"/>
+    <p:sldId id="271" r:id="rId20"/>
+    <p:sldId id="272" r:id="rId21"/>
+    <p:sldId id="273" r:id="rId22"/>
+    <p:sldId id="274" r:id="rId23"/>
+    <p:sldId id="275" r:id="rId24"/>
+    <p:sldId id="276" r:id="rId25"/>
+    <p:sldId id="289" r:id="rId26"/>
+    <p:sldId id="293" r:id="rId27"/>
+    <p:sldId id="292" r:id="rId28"/>
+    <p:sldId id="263" r:id="rId29"/>
   </p:sldIdLst>
   <p:sldSz cx="9144000" cy="6858000" type="screen4x3"/>
   <p:notesSz cx="6858000" cy="9144000"/>
@@ -185,7 +186,7 @@
             </a:lvl1pPr>
           </a:lstStyle>
           <a:p>
-            <a:endParaRPr lang="en-US"/>
+            <a:endParaRPr lang="en-US" dirty="0"/>
           </a:p>
         </p:txBody>
       </p:sp>
@@ -221,7 +222,7 @@
               <a:pPr/>
               <a:t>3/4/2023</a:t>
             </a:fld>
-            <a:endParaRPr lang="en-US"/>
+            <a:endParaRPr lang="en-US" dirty="0"/>
           </a:p>
         </p:txBody>
       </p:sp>
@@ -254,7 +255,7 @@
           <a:bodyPr vert="horz" lIns="91440" tIns="45720" rIns="91440" bIns="45720" rtlCol="0" anchor="ctr"/>
           <a:lstStyle/>
           <a:p>
-            <a:endParaRPr lang="en-US"/>
+            <a:endParaRPr lang="en-US" dirty="0"/>
           </a:p>
         </p:txBody>
       </p:sp>
@@ -347,7 +348,7 @@
             </a:lvl1pPr>
           </a:lstStyle>
           <a:p>
-            <a:endParaRPr lang="en-US"/>
+            <a:endParaRPr lang="en-US" dirty="0"/>
           </a:p>
         </p:txBody>
       </p:sp>
@@ -383,7 +384,7 @@
               <a:pPr/>
               <a:t>‹#›</a:t>
             </a:fld>
-            <a:endParaRPr lang="en-US"/>
+            <a:endParaRPr lang="en-US" dirty="0"/>
           </a:p>
         </p:txBody>
       </p:sp>
@@ -555,7 +556,7 @@
               <a:pPr/>
               <a:t>1</a:t>
             </a:fld>
-            <a:endParaRPr lang="en-US"/>
+            <a:endParaRPr lang="en-US" dirty="0"/>
           </a:p>
         </p:txBody>
       </p:sp>
@@ -2776,7 +2777,7 @@
           <a:lstStyle/>
           <a:p>
             <a:pPr algn="ctr" eaLnBrk="1" latinLnBrk="0" hangingPunct="1"/>
-            <a:endParaRPr kumimoji="0" lang="en-US"/>
+            <a:endParaRPr kumimoji="0" lang="en-US" dirty="0"/>
           </a:p>
         </p:txBody>
       </p:sp>
@@ -2831,7 +2832,7 @@
           <a:lstStyle/>
           <a:p>
             <a:pPr algn="ctr" eaLnBrk="1" latinLnBrk="0" hangingPunct="1"/>
-            <a:endParaRPr kumimoji="0" lang="en-US"/>
+            <a:endParaRPr kumimoji="0" lang="en-US" dirty="0"/>
           </a:p>
         </p:txBody>
       </p:sp>
@@ -3032,7 +3033,7 @@
           </a:lstStyle>
           <a:p>
             <a:r>
-              <a:rPr kumimoji="0" lang="en-US" smtClean="0"/>
+              <a:rPr kumimoji="0" lang="en-US" dirty="0" smtClean="0"/>
               <a:t>Click icon to add picture</a:t>
             </a:r>
             <a:endParaRPr kumimoji="0" lang="en-US" dirty="0"/>
@@ -3171,7 +3172,7 @@
           <a:lstStyle/>
           <a:p>
             <a:pPr marL="0" algn="l" rtl="0" eaLnBrk="1" latinLnBrk="0" hangingPunct="1"/>
-            <a:endParaRPr kumimoji="0" lang="en-US">
+            <a:endParaRPr kumimoji="0" lang="en-US" dirty="0">
               <a:solidFill>
                 <a:schemeClr val="tx1"/>
               </a:solidFill>
@@ -3284,7 +3285,7 @@
           <a:lstStyle/>
           <a:p>
             <a:pPr marL="0" algn="l" rtl="0" eaLnBrk="1" latinLnBrk="0" hangingPunct="1"/>
-            <a:endParaRPr kumimoji="0" lang="en-US">
+            <a:endParaRPr kumimoji="0" lang="en-US" dirty="0">
               <a:solidFill>
                 <a:schemeClr val="tx1"/>
               </a:solidFill>
@@ -3457,7 +3458,7 @@
           <a:lstStyle/>
           <a:p>
             <a:pPr marL="0" algn="l" rtl="0" eaLnBrk="1" latinLnBrk="0" hangingPunct="1"/>
-            <a:endParaRPr kumimoji="0" lang="en-US">
+            <a:endParaRPr kumimoji="0" lang="en-US" dirty="0">
               <a:solidFill>
                 <a:schemeClr val="tx1"/>
               </a:solidFill>
@@ -3570,7 +3571,7 @@
           <a:lstStyle/>
           <a:p>
             <a:pPr marL="0" algn="l" rtl="0" eaLnBrk="1" latinLnBrk="0" hangingPunct="1"/>
-            <a:endParaRPr kumimoji="0" lang="en-US">
+            <a:endParaRPr kumimoji="0" lang="en-US" dirty="0">
               <a:solidFill>
                 <a:schemeClr val="tx1"/>
               </a:solidFill>
@@ -3909,7 +3910,7 @@
             <a:bodyPr vert="horz" wrap="square" lIns="91440" tIns="45720" rIns="91440" bIns="45720" anchor="t" compatLnSpc="1"/>
             <a:lstStyle/>
             <a:p>
-              <a:endParaRPr kumimoji="0" lang="en-US"/>
+              <a:endParaRPr kumimoji="0" lang="en-US" dirty="0"/>
             </a:p>
           </p:txBody>
         </p:sp>
@@ -4006,7 +4007,7 @@
             <a:bodyPr vert="horz" wrap="square" lIns="91440" tIns="45720" rIns="91440" bIns="45720" anchor="t" compatLnSpc="1"/>
             <a:lstStyle/>
             <a:p>
-              <a:endParaRPr kumimoji="0" lang="en-US"/>
+              <a:endParaRPr kumimoji="0" lang="en-US" dirty="0"/>
             </a:p>
           </p:txBody>
         </p:sp>
@@ -4457,6 +4458,9 @@
   <p:clrMapOvr>
     <a:masterClrMapping/>
   </p:clrMapOvr>
+  <p:transition>
+    <p:wheel spokes="8"/>
+  </p:transition>
   <p:timing>
     <p:tnLst>
       <p:par>
@@ -4555,6 +4559,16 @@
   <p:clrMapOvr>
     <a:masterClrMapping/>
   </p:clrMapOvr>
+  <p:transition>
+    <p:wheel spokes="8"/>
+  </p:transition>
+  <p:timing>
+    <p:tnLst>
+      <p:par>
+        <p:cTn id="1" dur="indefinite" restart="never" nodeType="tmRoot"/>
+      </p:par>
+    </p:tnLst>
+  </p:timing>
 </p:sld>
 </file>
 
@@ -4651,6 +4665,16 @@
   <p:clrMapOvr>
     <a:masterClrMapping/>
   </p:clrMapOvr>
+  <p:transition>
+    <p:wheel spokes="8"/>
+  </p:transition>
+  <p:timing>
+    <p:tnLst>
+      <p:par>
+        <p:cTn id="1" dur="indefinite" restart="never" nodeType="tmRoot"/>
+      </p:par>
+    </p:tnLst>
+  </p:timing>
 </p:sld>
 </file>
 
@@ -4724,18 +4748,14 @@
             </a:pPr>
             <a:r>
               <a:rPr lang="en-US" b="1" dirty="0" smtClean="0"/>
-              <a:t>Step 1</a:t>
-            </a:r>
-            <a:r>
-              <a:rPr lang="en-US" b="1" dirty="0" smtClean="0"/>
-              <a:t>:</a:t>
+              <a:t>Step 1:</a:t>
             </a:r>
             <a:r>
               <a:rPr lang="en-US" dirty="0" smtClean="0"/>
               <a:t> Create Database </a:t>
             </a:r>
             <a:r>
-              <a:rPr lang="en-US" dirty="0" err="1" smtClean="0"/>
+              <a:rPr lang="en-US" dirty="0" smtClean="0"/>
               <a:t>indian_bank</a:t>
             </a:r>
             <a:endParaRPr lang="en-US" dirty="0" smtClean="0"/>
@@ -4754,13 +4774,8 @@
             </a:r>
             <a:r>
               <a:rPr lang="en-US" dirty="0" smtClean="0"/>
-              <a:t> Create Table name </a:t>
-            </a:r>
-            <a:r>
-              <a:rPr lang="en-US" dirty="0" smtClean="0"/>
-              <a:t>user</a:t>
-            </a:r>
-            <a:endParaRPr lang="en-US" dirty="0" smtClean="0"/>
+              <a:t> Create Table name user</a:t>
+            </a:r>
           </a:p>
           <a:p>
             <a:pPr>
@@ -4772,127 +4787,87 @@
             </a:pPr>
             <a:r>
               <a:rPr lang="en-US" dirty="0" smtClean="0"/>
-              <a:t>CREATE TABLE </a:t>
+              <a:t>CREATE TABLE `user`( `</a:t>
             </a:r>
             <a:r>
               <a:rPr lang="en-US" dirty="0" smtClean="0"/>
-              <a:t>`user`( </a:t>
+              <a:t>ac_no</a:t>
+            </a:r>
+            <a:r>
+              <a:rPr lang="en-US" dirty="0" smtClean="0"/>
+              <a:t>` </a:t>
+            </a:r>
+            <a:r>
+              <a:rPr lang="en-US" dirty="0" smtClean="0"/>
+              <a:t>int</a:t>
+            </a:r>
+            <a:r>
+              <a:rPr lang="en-US" dirty="0" smtClean="0"/>
+              <a:t> DEFAULT </a:t>
+            </a:r>
+            <a:r>
+              <a:rPr lang="en-US" dirty="0" smtClean="0"/>
+              <a:t>NULL </a:t>
+            </a:r>
+            <a:r>
+              <a:rPr lang="en-US" dirty="0" smtClean="0"/>
+              <a:t>UNIQUE KEY</a:t>
+            </a:r>
+            <a:r>
+              <a:rPr lang="en-US" dirty="0" smtClean="0"/>
+              <a:t> , </a:t>
             </a:r>
             <a:r>
               <a:rPr lang="en-US" dirty="0" smtClean="0"/>
               <a:t>`</a:t>
             </a:r>
             <a:r>
-              <a:rPr lang="en-US" dirty="0" err="1" smtClean="0"/>
-              <a:t>ac_no</a:t>
+              <a:rPr lang="en-US" dirty="0" smtClean="0"/>
+              <a:t>user_name</a:t>
             </a:r>
             <a:r>
               <a:rPr lang="en-US" dirty="0" smtClean="0"/>
               <a:t>` </a:t>
             </a:r>
             <a:r>
-              <a:rPr lang="en-US" dirty="0" err="1" smtClean="0"/>
-              <a:t>int</a:t>
-            </a:r>
-            <a:r>
               <a:rPr lang="en-US" dirty="0" smtClean="0"/>
-              <a:t> NOT </a:t>
+              <a:t>varchar</a:t>
             </a:r>
             <a:r>
               <a:rPr lang="en-US" dirty="0" smtClean="0"/>
-              <a:t>NULL PRIMARY KEY </a:t>
+              <a:t>(45) UNIQUE KEY DEFAULT </a:t>
             </a:r>
             <a:r>
               <a:rPr lang="en-US" dirty="0" smtClean="0"/>
-              <a:t>AUTO_INCREMENT, </a:t>
-            </a:r>
-            <a:r>
-              <a:rPr lang="en-US" dirty="0" smtClean="0"/>
-              <a:t>`</a:t>
-            </a:r>
-            <a:r>
-              <a:rPr lang="en-US" dirty="0" err="1" smtClean="0"/>
-              <a:t>user_name</a:t>
+              <a:t>NULL,`balance</a:t>
             </a:r>
             <a:r>
               <a:rPr lang="en-US" dirty="0" smtClean="0"/>
               <a:t>` </a:t>
             </a:r>
             <a:r>
-              <a:rPr lang="en-US" dirty="0" err="1" smtClean="0"/>
-              <a:t>varchar</a:t>
-            </a:r>
-            <a:r>
               <a:rPr lang="en-US" dirty="0" smtClean="0"/>
-              <a:t>(45</a:t>
+              <a:t>int</a:t>
             </a:r>
             <a:r>
               <a:rPr lang="en-US" dirty="0" smtClean="0"/>
-              <a:t>) UNIQUE KEY </a:t>
+              <a:t> DEFAULT </a:t>
             </a:r>
             <a:r>
               <a:rPr lang="en-US" dirty="0" smtClean="0"/>
-              <a:t>DEFAULT </a:t>
-            </a:r>
-            <a:r>
-              <a:rPr lang="en-US" dirty="0" err="1" smtClean="0"/>
-              <a:t>NULL</a:t>
-            </a:r>
-            <a:r>
-              <a:rPr lang="en-US" dirty="0" err="1" smtClean="0"/>
-              <a:t>,`</a:t>
-            </a:r>
-            <a:r>
-              <a:rPr lang="en-US" dirty="0" err="1" smtClean="0"/>
-              <a:t>balance</a:t>
+              <a:t>NULL,`pass_code</a:t>
             </a:r>
             <a:r>
               <a:rPr lang="en-US" dirty="0" smtClean="0"/>
               <a:t>` </a:t>
             </a:r>
             <a:r>
-              <a:rPr lang="en-US" dirty="0" err="1" smtClean="0"/>
+              <a:rPr lang="en-US" dirty="0" smtClean="0"/>
               <a:t>int</a:t>
             </a:r>
             <a:r>
               <a:rPr lang="en-US" dirty="0" smtClean="0"/>
-              <a:t> </a:t>
-            </a:r>
-            <a:r>
-              <a:rPr lang="en-US" dirty="0" smtClean="0"/>
-              <a:t>DEFAULT </a:t>
-            </a:r>
-            <a:r>
-              <a:rPr lang="en-US" dirty="0" err="1" smtClean="0"/>
-              <a:t>NULL</a:t>
-            </a:r>
-            <a:r>
-              <a:rPr lang="en-US" dirty="0" err="1" smtClean="0"/>
-              <a:t>,`</a:t>
-            </a:r>
-            <a:r>
-              <a:rPr lang="en-US" dirty="0" err="1" smtClean="0"/>
-              <a:t>pass_code</a:t>
-            </a:r>
-            <a:r>
-              <a:rPr lang="en-US" dirty="0" smtClean="0"/>
-              <a:t>` </a:t>
-            </a:r>
-            <a:r>
-              <a:rPr lang="en-US" dirty="0" err="1" smtClean="0"/>
-              <a:t>int</a:t>
-            </a:r>
-            <a:r>
-              <a:rPr lang="en-US" dirty="0" smtClean="0"/>
-              <a:t> DEFAULT </a:t>
-            </a:r>
-            <a:r>
-              <a:rPr lang="en-US" dirty="0" smtClean="0"/>
-              <a:t>NULL); </a:t>
-            </a:r>
-            <a:r>
-              <a:rPr lang="en-US" dirty="0" smtClean="0"/>
-              <a:t/>
+              <a:t> DEFAULT NULL); </a:t>
             </a:r>
             <a:br>
               <a:rPr lang="en-US" dirty="0" smtClean="0"/>
@@ -4906,6 +4881,16 @@
   <p:clrMapOvr>
     <a:masterClrMapping/>
   </p:clrMapOvr>
+  <p:transition>
+    <p:wheel spokes="8"/>
+  </p:transition>
+  <p:timing>
+    <p:tnLst>
+      <p:par>
+        <p:cTn id="1" dur="indefinite" restart="never" nodeType="tmRoot"/>
+      </p:par>
+    </p:tnLst>
+  </p:timing>
 </p:sld>
 </file>
 
@@ -4997,6 +4982,16 @@
   <p:clrMapOvr>
     <a:masterClrMapping/>
   </p:clrMapOvr>
+  <p:transition>
+    <p:wheel spokes="8"/>
+  </p:transition>
+  <p:timing>
+    <p:tnLst>
+      <p:par>
+        <p:cTn id="1" dur="indefinite" restart="never" nodeType="tmRoot"/>
+      </p:par>
+    </p:tnLst>
+  </p:timing>
 </p:sld>
 </file>
 
@@ -5039,7 +5034,7 @@
           <a:p>
             <a:pPr algn="ctr"/>
             <a:r>
-              <a:rPr lang="en-US" sz="4800" dirty="0" err="1" smtClean="0">
+              <a:rPr lang="en-US" sz="4800" dirty="0" smtClean="0">
                 <a:solidFill>
                   <a:srgbClr val="C00000"/>
                 </a:solidFill>
@@ -5062,7 +5057,7 @@
       </p:sp>
       <p:pic>
         <p:nvPicPr>
-          <p:cNvPr id="17411" name="Picture 3"/>
+          <p:cNvPr id="1026" name="Picture 2"/>
           <p:cNvPicPr>
             <a:picLocks noGrp="1" noChangeAspect="1" noChangeArrowheads="1"/>
           </p:cNvPicPr>
@@ -5079,8 +5074,8 @@
         </p:blipFill>
         <p:spPr bwMode="auto">
           <a:xfrm>
-            <a:off x="685800" y="2286000"/>
-            <a:ext cx="7619999" cy="3962399"/>
+            <a:off x="762000" y="1905000"/>
+            <a:ext cx="7543799" cy="3962400"/>
           </a:xfrm>
           <a:prstGeom prst="rect">
             <a:avLst/>
@@ -5100,10 +5095,128 @@
   <p:clrMapOvr>
     <a:masterClrMapping/>
   </p:clrMapOvr>
+  <p:transition>
+    <p:wheel spokes="8"/>
+  </p:transition>
+  <p:timing>
+    <p:tnLst>
+      <p:par>
+        <p:cTn id="1" dur="indefinite" restart="never" nodeType="tmRoot"/>
+      </p:par>
+    </p:tnLst>
+  </p:timing>
 </p:sld>
 </file>
 
 <file path=ppt/slides/slide15.xml><?xml version="1.0" encoding="utf-8"?>
+<p:sld xmlns:a="http://schemas.openxmlformats.org/drawingml/2006/main" xmlns:r="http://schemas.openxmlformats.org/officeDocument/2006/relationships" xmlns:p="http://schemas.openxmlformats.org/presentationml/2006/main">
+  <p:cSld>
+    <p:spTree>
+      <p:nvGrpSpPr>
+        <p:cNvPr id="1" name=""/>
+        <p:cNvGrpSpPr/>
+        <p:nvPr/>
+      </p:nvGrpSpPr>
+      <p:grpSpPr>
+        <a:xfrm>
+          <a:off x="0" y="0"/>
+          <a:ext cx="0" cy="0"/>
+          <a:chOff x="0" y="0"/>
+          <a:chExt cx="0" cy="0"/>
+        </a:xfrm>
+      </p:grpSpPr>
+      <p:sp>
+        <p:nvSpPr>
+          <p:cNvPr id="2" name="Title 1"/>
+          <p:cNvSpPr>
+            <a:spLocks noGrp="1"/>
+          </p:cNvSpPr>
+          <p:nvPr>
+            <p:ph type="title"/>
+          </p:nvPr>
+        </p:nvSpPr>
+        <p:spPr/>
+        <p:txBody>
+          <a:bodyPr/>
+          <a:lstStyle/>
+          <a:p>
+            <a:pPr algn="ctr"/>
+            <a:r>
+              <a:rPr lang="en-US" sz="5400" dirty="0" smtClean="0">
+                <a:solidFill>
+                  <a:srgbClr val="C00000"/>
+                </a:solidFill>
+                <a:latin typeface="Algerian" pitchFamily="82" charset="0"/>
+              </a:rPr>
+              <a:t>Mysql</a:t>
+            </a:r>
+            <a:r>
+              <a:rPr lang="en-US" sz="5400" dirty="0" smtClean="0">
+                <a:solidFill>
+                  <a:srgbClr val="C00000"/>
+                </a:solidFill>
+                <a:latin typeface="Algerian" pitchFamily="82" charset="0"/>
+              </a:rPr>
+              <a:t> output</a:t>
+            </a:r>
+            <a:endParaRPr lang="en-US" dirty="0"/>
+          </a:p>
+        </p:txBody>
+      </p:sp>
+      <p:pic>
+        <p:nvPicPr>
+          <p:cNvPr id="2050" name="Picture 2"/>
+          <p:cNvPicPr>
+            <a:picLocks noGrp="1" noChangeAspect="1" noChangeArrowheads="1"/>
+          </p:cNvPicPr>
+          <p:nvPr>
+            <p:ph idx="1"/>
+          </p:nvPr>
+        </p:nvPicPr>
+        <p:blipFill>
+          <a:blip r:embed="rId2"/>
+          <a:srcRect/>
+          <a:stretch>
+            <a:fillRect/>
+          </a:stretch>
+        </p:blipFill>
+        <p:spPr bwMode="auto">
+          <a:xfrm>
+            <a:off x="914400" y="2362201"/>
+            <a:ext cx="7315200" cy="4038600"/>
+          </a:xfrm>
+          <a:prstGeom prst="rect">
+            <a:avLst/>
+          </a:prstGeom>
+          <a:noFill/>
+          <a:ln w="9525">
+            <a:noFill/>
+            <a:miter lim="800000"/>
+            <a:headEnd/>
+            <a:tailEnd/>
+          </a:ln>
+          <a:effectLst/>
+        </p:spPr>
+      </p:pic>
+    </p:spTree>
+  </p:cSld>
+  <p:clrMapOvr>
+    <a:masterClrMapping/>
+  </p:clrMapOvr>
+  <p:transition>
+    <p:wheel spokes="8"/>
+  </p:transition>
+  <p:timing>
+    <p:tnLst>
+      <p:par>
+        <p:cTn id="1" dur="indefinite" restart="never" nodeType="tmRoot"/>
+      </p:par>
+    </p:tnLst>
+  </p:timing>
+</p:sld>
+</file>
+
+<file path=ppt/slides/slide16.xml><?xml version="1.0" encoding="utf-8"?>
 <p:sld xmlns:a="http://schemas.openxmlformats.org/drawingml/2006/main" xmlns:r="http://schemas.openxmlformats.org/officeDocument/2006/relationships" xmlns:p="http://schemas.openxmlformats.org/presentationml/2006/main">
   <p:cSld>
     <p:spTree>
@@ -5377,15 +5490,7 @@
                   <a:schemeClr val="tx1"/>
                 </a:solidFill>
               </a:rPr>
-              <a:t>To  be entered choice </a:t>
-            </a:r>
-            <a:r>
-              <a:rPr lang="en-US" sz="1200" dirty="0" smtClean="0">
-                <a:solidFill>
-                  <a:schemeClr val="tx1"/>
-                </a:solidFill>
-              </a:rPr>
-              <a:t>option and login account</a:t>
+              <a:t>To  be entered choice option and login account</a:t>
             </a:r>
             <a:endParaRPr lang="en-US" sz="1200" dirty="0">
               <a:solidFill>
@@ -5400,10 +5505,20 @@
   <p:clrMapOvr>
     <a:masterClrMapping/>
   </p:clrMapOvr>
+  <p:transition>
+    <p:wheel spokes="8"/>
+  </p:transition>
+  <p:timing>
+    <p:tnLst>
+      <p:par>
+        <p:cTn id="1" dur="indefinite" restart="never" nodeType="tmRoot"/>
+      </p:par>
+    </p:tnLst>
+  </p:timing>
 </p:sld>
 </file>
 
-<file path=ppt/slides/slide16.xml><?xml version="1.0" encoding="utf-8"?>
+<file path=ppt/slides/slide17.xml><?xml version="1.0" encoding="utf-8"?>
 <p:sld xmlns:a="http://schemas.openxmlformats.org/drawingml/2006/main" xmlns:r="http://schemas.openxmlformats.org/officeDocument/2006/relationships" xmlns:p="http://schemas.openxmlformats.org/presentationml/2006/main">
   <p:cSld>
     <p:spTree>
@@ -5541,15 +5656,7 @@
                   <a:schemeClr val="tx1"/>
                 </a:solidFill>
               </a:rPr>
-              <a:t>To  be entered  choice  for  </a:t>
-            </a:r>
-            <a:r>
-              <a:rPr lang="en-US" sz="1200" dirty="0" smtClean="0">
-                <a:solidFill>
-                  <a:schemeClr val="tx1"/>
-                </a:solidFill>
-              </a:rPr>
-              <a:t>delete and</a:t>
+              <a:t>To  be entered  choice  for  delete and</a:t>
             </a:r>
             <a:r>
               <a:rPr lang="en-US" sz="1200" dirty="0">
@@ -5567,11 +5674,6 @@
               </a:rPr>
               <a:t>username and password</a:t>
             </a:r>
-            <a:endParaRPr lang="en-US" sz="1200" dirty="0" smtClean="0">
-              <a:solidFill>
-                <a:schemeClr val="tx1"/>
-              </a:solidFill>
-            </a:endParaRPr>
           </a:p>
         </p:txBody>
       </p:sp>
@@ -5632,15 +5734,7 @@
                   <a:schemeClr val="tx1"/>
                 </a:solidFill>
               </a:rPr>
-              <a:t>Deleted </a:t>
-            </a:r>
-            <a:r>
-              <a:rPr lang="en-US" sz="1200" dirty="0" smtClean="0">
-                <a:solidFill>
-                  <a:schemeClr val="tx1"/>
-                </a:solidFill>
-              </a:rPr>
-              <a:t>message</a:t>
+              <a:t>Deleted message</a:t>
             </a:r>
             <a:endParaRPr lang="en-US" sz="1200" dirty="0">
               <a:solidFill>
@@ -5655,10 +5749,20 @@
   <p:clrMapOvr>
     <a:masterClrMapping/>
   </p:clrMapOvr>
+  <p:transition>
+    <p:wheel spokes="8"/>
+  </p:transition>
+  <p:timing>
+    <p:tnLst>
+      <p:par>
+        <p:cTn id="1" dur="indefinite" restart="never" nodeType="tmRoot"/>
+      </p:par>
+    </p:tnLst>
+  </p:timing>
 </p:sld>
 </file>
 
-<file path=ppt/slides/slide17.xml><?xml version="1.0" encoding="utf-8"?>
+<file path=ppt/slides/slide18.xml><?xml version="1.0" encoding="utf-8"?>
 <p:sld xmlns:a="http://schemas.openxmlformats.org/drawingml/2006/main" xmlns:r="http://schemas.openxmlformats.org/officeDocument/2006/relationships" xmlns:p="http://schemas.openxmlformats.org/presentationml/2006/main">
   <p:cSld>
     <p:spTree>
@@ -5891,10 +5995,20 @@
   <p:clrMapOvr>
     <a:masterClrMapping/>
   </p:clrMapOvr>
+  <p:transition>
+    <p:wheel spokes="8"/>
+  </p:transition>
+  <p:timing>
+    <p:tnLst>
+      <p:par>
+        <p:cTn id="1" dur="indefinite" restart="never" nodeType="tmRoot"/>
+      </p:par>
+    </p:tnLst>
+  </p:timing>
 </p:sld>
 </file>
 
-<file path=ppt/slides/slide18.xml><?xml version="1.0" encoding="utf-8"?>
+<file path=ppt/slides/slide19.xml><?xml version="1.0" encoding="utf-8"?>
 <p:sld xmlns:a="http://schemas.openxmlformats.org/drawingml/2006/main" xmlns:r="http://schemas.openxmlformats.org/officeDocument/2006/relationships" xmlns:p="http://schemas.openxmlformats.org/presentationml/2006/main">
   <p:cSld>
     <p:spTree>
@@ -6032,23 +6146,7 @@
                   <a:schemeClr val="tx1"/>
                 </a:solidFill>
               </a:rPr>
-              <a:t>To  be entered  choice  for  </a:t>
-            </a:r>
-            <a:r>
-              <a:rPr lang="en-US" sz="1200" dirty="0" smtClean="0">
-                <a:solidFill>
-                  <a:schemeClr val="tx1"/>
-                </a:solidFill>
-              </a:rPr>
-              <a:t>withdraw </a:t>
-            </a:r>
-            <a:r>
-              <a:rPr lang="en-US" sz="1200" dirty="0" smtClean="0">
-                <a:solidFill>
-                  <a:schemeClr val="tx1"/>
-                </a:solidFill>
-              </a:rPr>
-              <a:t>and</a:t>
+              <a:t>To  be entered  choice  for  withdraw and</a:t>
             </a:r>
           </a:p>
           <a:p>
@@ -6126,23 +6224,7 @@
                   <a:schemeClr val="tx1"/>
                 </a:solidFill>
               </a:rPr>
-              <a:t>Withdrawn</a:t>
-            </a:r>
-            <a:r>
-              <a:rPr lang="en-US" sz="1200" dirty="0" smtClean="0">
-                <a:solidFill>
-                  <a:schemeClr val="tx1"/>
-                </a:solidFill>
-              </a:rPr>
-              <a:t> </a:t>
-            </a:r>
-            <a:r>
-              <a:rPr lang="en-US" sz="1200" dirty="0" smtClean="0">
-                <a:solidFill>
-                  <a:schemeClr val="tx1"/>
-                </a:solidFill>
-              </a:rPr>
-              <a:t>message</a:t>
+              <a:t>Withdrawn message</a:t>
             </a:r>
             <a:endParaRPr lang="en-US" sz="1200" dirty="0">
               <a:solidFill>
@@ -6157,10 +6239,208 @@
   <p:clrMapOvr>
     <a:masterClrMapping/>
   </p:clrMapOvr>
+  <p:transition>
+    <p:wheel spokes="8"/>
+  </p:transition>
+  <p:timing>
+    <p:tnLst>
+      <p:par>
+        <p:cTn id="1" dur="indefinite" restart="never" nodeType="tmRoot"/>
+      </p:par>
+    </p:tnLst>
+  </p:timing>
 </p:sld>
 </file>
 
-<file path=ppt/slides/slide19.xml><?xml version="1.0" encoding="utf-8"?>
+<file path=ppt/slides/slide2.xml><?xml version="1.0" encoding="utf-8"?>
+<p:sld xmlns:a="http://schemas.openxmlformats.org/drawingml/2006/main" xmlns:r="http://schemas.openxmlformats.org/officeDocument/2006/relationships" xmlns:p="http://schemas.openxmlformats.org/presentationml/2006/main">
+  <p:cSld>
+    <p:spTree>
+      <p:nvGrpSpPr>
+        <p:cNvPr id="1" name=""/>
+        <p:cNvGrpSpPr/>
+        <p:nvPr/>
+      </p:nvGrpSpPr>
+      <p:grpSpPr>
+        <a:xfrm>
+          <a:off x="0" y="0"/>
+          <a:ext cx="0" cy="0"/>
+          <a:chOff x="0" y="0"/>
+          <a:chExt cx="0" cy="0"/>
+        </a:xfrm>
+      </p:grpSpPr>
+      <p:sp>
+        <p:nvSpPr>
+          <p:cNvPr id="2" name="Title 1"/>
+          <p:cNvSpPr>
+            <a:spLocks noGrp="1"/>
+          </p:cNvSpPr>
+          <p:nvPr>
+            <p:ph type="title"/>
+          </p:nvPr>
+        </p:nvSpPr>
+        <p:spPr/>
+        <p:txBody>
+          <a:bodyPr>
+            <a:normAutofit/>
+          </a:bodyPr>
+          <a:lstStyle/>
+          <a:p>
+            <a:pPr algn="ctr"/>
+            <a:r>
+              <a:rPr lang="en-US" sz="4800" dirty="0" smtClean="0">
+                <a:solidFill>
+                  <a:srgbClr val="C00000"/>
+                </a:solidFill>
+                <a:latin typeface="Algerian" pitchFamily="82" charset="0"/>
+              </a:rPr>
+              <a:t>outline</a:t>
+            </a:r>
+            <a:endParaRPr lang="en-US" sz="4800" dirty="0">
+              <a:solidFill>
+                <a:srgbClr val="C00000"/>
+              </a:solidFill>
+              <a:latin typeface="Algerian" pitchFamily="82" charset="0"/>
+            </a:endParaRPr>
+          </a:p>
+        </p:txBody>
+      </p:sp>
+      <p:sp>
+        <p:nvSpPr>
+          <p:cNvPr id="3" name="Content Placeholder 2"/>
+          <p:cNvSpPr>
+            <a:spLocks noGrp="1"/>
+          </p:cNvSpPr>
+          <p:nvPr>
+            <p:ph idx="1"/>
+          </p:nvPr>
+        </p:nvSpPr>
+        <p:spPr/>
+        <p:txBody>
+          <a:bodyPr>
+            <a:normAutofit/>
+          </a:bodyPr>
+          <a:lstStyle/>
+          <a:p>
+            <a:pPr>
+              <a:buClrTx/>
+              <a:buFont typeface="Wingdings" pitchFamily="2" charset="2"/>
+              <a:buChar char="v"/>
+            </a:pPr>
+            <a:r>
+              <a:rPr lang="en-US" dirty="0" smtClean="0"/>
+              <a:t>  Aim of the project</a:t>
+            </a:r>
+          </a:p>
+          <a:p>
+            <a:pPr>
+              <a:buClrTx/>
+              <a:buFont typeface="Wingdings" pitchFamily="2" charset="2"/>
+              <a:buChar char="v"/>
+            </a:pPr>
+            <a:r>
+              <a:rPr lang="en-US" dirty="0" smtClean="0"/>
+              <a:t>  Background details</a:t>
+            </a:r>
+          </a:p>
+          <a:p>
+            <a:pPr lvl="2">
+              <a:buClrTx/>
+              <a:buFont typeface="Wingdings" pitchFamily="2" charset="2"/>
+              <a:buChar char="v"/>
+            </a:pPr>
+            <a:r>
+              <a:rPr lang="en-US" dirty="0" smtClean="0"/>
+              <a:t>Purpose</a:t>
+            </a:r>
+          </a:p>
+          <a:p>
+            <a:pPr lvl="2">
+              <a:buClrTx/>
+              <a:buFont typeface="Wingdings" pitchFamily="2" charset="2"/>
+              <a:buChar char="v"/>
+            </a:pPr>
+            <a:r>
+              <a:rPr lang="en-US" dirty="0" smtClean="0"/>
+              <a:t>Requirements	</a:t>
+            </a:r>
+          </a:p>
+          <a:p>
+            <a:pPr>
+              <a:buClrTx/>
+              <a:buFont typeface="Wingdings" pitchFamily="2" charset="2"/>
+              <a:buChar char="v"/>
+            </a:pPr>
+            <a:r>
+              <a:rPr lang="en-US" dirty="0" smtClean="0"/>
+              <a:t>  Application Description</a:t>
+            </a:r>
+          </a:p>
+          <a:p>
+            <a:pPr>
+              <a:buClrTx/>
+              <a:buFont typeface="Wingdings" pitchFamily="2" charset="2"/>
+              <a:buChar char="v"/>
+            </a:pPr>
+            <a:r>
+              <a:rPr lang="en-US" dirty="0" smtClean="0"/>
+              <a:t>  Modules Description 	</a:t>
+            </a:r>
+          </a:p>
+          <a:p>
+            <a:pPr>
+              <a:buClrTx/>
+              <a:buFont typeface="Wingdings" pitchFamily="2" charset="2"/>
+              <a:buChar char="v"/>
+            </a:pPr>
+            <a:r>
+              <a:rPr lang="en-US" dirty="0" smtClean="0"/>
+              <a:t>  Compilation</a:t>
+            </a:r>
+          </a:p>
+          <a:p>
+            <a:pPr>
+              <a:buClrTx/>
+              <a:buFont typeface="Wingdings" pitchFamily="2" charset="2"/>
+              <a:buChar char="v"/>
+            </a:pPr>
+            <a:r>
+              <a:rPr lang="en-US" dirty="0" smtClean="0"/>
+              <a:t>  Welcome screen</a:t>
+            </a:r>
+          </a:p>
+          <a:p>
+            <a:pPr>
+              <a:buClrTx/>
+              <a:buFont typeface="Wingdings" pitchFamily="2" charset="2"/>
+              <a:buChar char="v"/>
+            </a:pPr>
+            <a:r>
+              <a:rPr lang="en-US" dirty="0" smtClean="0"/>
+              <a:t>  Main menu </a:t>
+            </a:r>
+          </a:p>
+        </p:txBody>
+      </p:sp>
+    </p:spTree>
+  </p:cSld>
+  <p:clrMapOvr>
+    <a:masterClrMapping/>
+  </p:clrMapOvr>
+  <p:transition>
+    <p:wheel spokes="8"/>
+  </p:transition>
+  <p:timing>
+    <p:tnLst>
+      <p:par>
+        <p:cTn id="1" dur="indefinite" restart="never" nodeType="tmRoot"/>
+      </p:par>
+    </p:tnLst>
+  </p:timing>
+</p:sld>
+</file>
+
+<file path=ppt/slides/slide20.xml><?xml version="1.0" encoding="utf-8"?>
 <p:sld xmlns:a="http://schemas.openxmlformats.org/drawingml/2006/main" xmlns:r="http://schemas.openxmlformats.org/officeDocument/2006/relationships" xmlns:p="http://schemas.openxmlformats.org/presentationml/2006/main">
   <p:cSld>
     <p:spTree>
@@ -6298,29 +6578,8 @@
                   <a:schemeClr val="tx1"/>
                 </a:solidFill>
               </a:rPr>
-              <a:t>To  be entered  choice  for  </a:t>
-            </a:r>
-            <a:r>
-              <a:rPr lang="en-US" sz="1200" dirty="0" smtClean="0">
-                <a:solidFill>
-                  <a:schemeClr val="tx1"/>
-                </a:solidFill>
-              </a:rPr>
-              <a:t>transfer money</a:t>
-            </a:r>
-            <a:r>
-              <a:rPr lang="en-US" sz="1200" dirty="0" smtClean="0">
-                <a:solidFill>
-                  <a:schemeClr val="tx1"/>
-                </a:solidFill>
-              </a:rPr>
-              <a:t> and entering receiver account number and </a:t>
-            </a:r>
-            <a:endParaRPr lang="en-US" sz="1200" dirty="0" smtClean="0">
-              <a:solidFill>
-                <a:schemeClr val="tx1"/>
-              </a:solidFill>
-            </a:endParaRPr>
+              <a:t>To  be entered  choice  for  transfer money and entering receiver account number and </a:t>
+            </a:r>
           </a:p>
           <a:p>
             <a:pPr algn="ctr"/>
@@ -6397,23 +6656,7 @@
                   <a:schemeClr val="tx1"/>
                 </a:solidFill>
               </a:rPr>
-              <a:t>send</a:t>
-            </a:r>
-            <a:r>
-              <a:rPr lang="en-US" sz="1200" dirty="0" smtClean="0">
-                <a:solidFill>
-                  <a:schemeClr val="tx1"/>
-                </a:solidFill>
-              </a:rPr>
-              <a:t> </a:t>
-            </a:r>
-            <a:r>
-              <a:rPr lang="en-US" sz="1200" dirty="0" smtClean="0">
-                <a:solidFill>
-                  <a:schemeClr val="tx1"/>
-                </a:solidFill>
-              </a:rPr>
-              <a:t>message</a:t>
+              <a:t>send message</a:t>
             </a:r>
             <a:endParaRPr lang="en-US" sz="1200" dirty="0">
               <a:solidFill>
@@ -6428,184 +6671,9 @@
   <p:clrMapOvr>
     <a:masterClrMapping/>
   </p:clrMapOvr>
-</p:sld>
-</file>
-
-<file path=ppt/slides/slide2.xml><?xml version="1.0" encoding="utf-8"?>
-<p:sld xmlns:a="http://schemas.openxmlformats.org/drawingml/2006/main" xmlns:r="http://schemas.openxmlformats.org/officeDocument/2006/relationships" xmlns:p="http://schemas.openxmlformats.org/presentationml/2006/main">
-  <p:cSld>
-    <p:spTree>
-      <p:nvGrpSpPr>
-        <p:cNvPr id="1" name=""/>
-        <p:cNvGrpSpPr/>
-        <p:nvPr/>
-      </p:nvGrpSpPr>
-      <p:grpSpPr>
-        <a:xfrm>
-          <a:off x="0" y="0"/>
-          <a:ext cx="0" cy="0"/>
-          <a:chOff x="0" y="0"/>
-          <a:chExt cx="0" cy="0"/>
-        </a:xfrm>
-      </p:grpSpPr>
-      <p:sp>
-        <p:nvSpPr>
-          <p:cNvPr id="2" name="Title 1"/>
-          <p:cNvSpPr>
-            <a:spLocks noGrp="1"/>
-          </p:cNvSpPr>
-          <p:nvPr>
-            <p:ph type="title"/>
-          </p:nvPr>
-        </p:nvSpPr>
-        <p:spPr/>
-        <p:txBody>
-          <a:bodyPr>
-            <a:normAutofit/>
-          </a:bodyPr>
-          <a:lstStyle/>
-          <a:p>
-            <a:pPr algn="ctr"/>
-            <a:r>
-              <a:rPr lang="en-US" sz="4800" dirty="0" smtClean="0">
-                <a:solidFill>
-                  <a:srgbClr val="C00000"/>
-                </a:solidFill>
-                <a:latin typeface="Algerian" pitchFamily="82" charset="0"/>
-              </a:rPr>
-              <a:t>outline</a:t>
-            </a:r>
-            <a:endParaRPr lang="en-US" sz="4800" dirty="0">
-              <a:solidFill>
-                <a:srgbClr val="C00000"/>
-              </a:solidFill>
-              <a:latin typeface="Algerian" pitchFamily="82" charset="0"/>
-            </a:endParaRPr>
-          </a:p>
-        </p:txBody>
-      </p:sp>
-      <p:sp>
-        <p:nvSpPr>
-          <p:cNvPr id="3" name="Content Placeholder 2"/>
-          <p:cNvSpPr>
-            <a:spLocks noGrp="1"/>
-          </p:cNvSpPr>
-          <p:nvPr>
-            <p:ph idx="1"/>
-          </p:nvPr>
-        </p:nvSpPr>
-        <p:spPr/>
-        <p:txBody>
-          <a:bodyPr>
-            <a:normAutofit/>
-          </a:bodyPr>
-          <a:lstStyle/>
-          <a:p>
-            <a:pPr>
-              <a:buClrTx/>
-              <a:buFont typeface="Wingdings" pitchFamily="2" charset="2"/>
-              <a:buChar char="v"/>
-            </a:pPr>
-            <a:r>
-              <a:rPr lang="en-US" dirty="0" smtClean="0"/>
-              <a:t>  Aim of the project</a:t>
-            </a:r>
-          </a:p>
-          <a:p>
-            <a:pPr>
-              <a:buClrTx/>
-              <a:buFont typeface="Wingdings" pitchFamily="2" charset="2"/>
-              <a:buChar char="v"/>
-            </a:pPr>
-            <a:r>
-              <a:rPr lang="en-US" dirty="0" smtClean="0"/>
-              <a:t>  Background details</a:t>
-            </a:r>
-          </a:p>
-          <a:p>
-            <a:pPr lvl="2">
-              <a:buClrTx/>
-              <a:buFont typeface="Wingdings" pitchFamily="2" charset="2"/>
-              <a:buChar char="v"/>
-            </a:pPr>
-            <a:r>
-              <a:rPr lang="en-US" dirty="0" smtClean="0"/>
-              <a:t>Purpose</a:t>
-            </a:r>
-          </a:p>
-          <a:p>
-            <a:pPr lvl="2">
-              <a:buClrTx/>
-              <a:buFont typeface="Wingdings" pitchFamily="2" charset="2"/>
-              <a:buChar char="v"/>
-            </a:pPr>
-            <a:r>
-              <a:rPr lang="en-US" dirty="0" smtClean="0"/>
-              <a:t>Requirements	</a:t>
-            </a:r>
-          </a:p>
-          <a:p>
-            <a:pPr>
-              <a:buClrTx/>
-              <a:buFont typeface="Wingdings" pitchFamily="2" charset="2"/>
-              <a:buChar char="v"/>
-            </a:pPr>
-            <a:r>
-              <a:rPr lang="en-US" dirty="0" smtClean="0"/>
-              <a:t>  Application Description</a:t>
-            </a:r>
-          </a:p>
-          <a:p>
-            <a:pPr>
-              <a:buClrTx/>
-              <a:buFont typeface="Wingdings" pitchFamily="2" charset="2"/>
-              <a:buChar char="v"/>
-            </a:pPr>
-            <a:r>
-              <a:rPr lang="en-US" dirty="0" smtClean="0"/>
-              <a:t>  Modules Description 	</a:t>
-            </a:r>
-          </a:p>
-          <a:p>
-            <a:pPr>
-              <a:buClrTx/>
-              <a:buFont typeface="Wingdings" pitchFamily="2" charset="2"/>
-              <a:buChar char="v"/>
-            </a:pPr>
-            <a:r>
-              <a:rPr lang="en-US" dirty="0" smtClean="0"/>
-              <a:t>  Compilation</a:t>
-            </a:r>
-          </a:p>
-          <a:p>
-            <a:pPr>
-              <a:buClrTx/>
-              <a:buFont typeface="Wingdings" pitchFamily="2" charset="2"/>
-              <a:buChar char="v"/>
-            </a:pPr>
-            <a:r>
-              <a:rPr lang="en-US" dirty="0" smtClean="0"/>
-              <a:t>  Welcome screen</a:t>
-            </a:r>
-          </a:p>
-          <a:p>
-            <a:pPr>
-              <a:buClrTx/>
-              <a:buFont typeface="Wingdings" pitchFamily="2" charset="2"/>
-              <a:buChar char="v"/>
-            </a:pPr>
-            <a:r>
-              <a:rPr lang="en-US" dirty="0" smtClean="0"/>
-              <a:t>  Main menu </a:t>
-            </a:r>
-          </a:p>
-        </p:txBody>
-      </p:sp>
-    </p:spTree>
-  </p:cSld>
-  <p:clrMapOvr>
-    <a:masterClrMapping/>
-  </p:clrMapOvr>
+  <p:transition>
+    <p:wheel spokes="8"/>
+  </p:transition>
   <p:timing>
     <p:tnLst>
       <p:par>
@@ -6616,7 +6684,7 @@
 </p:sld>
 </file>
 
-<file path=ppt/slides/slide20.xml><?xml version="1.0" encoding="utf-8"?>
+<file path=ppt/slides/slide21.xml><?xml version="1.0" encoding="utf-8"?>
 <p:sld xmlns:a="http://schemas.openxmlformats.org/drawingml/2006/main" xmlns:r="http://schemas.openxmlformats.org/officeDocument/2006/relationships" xmlns:p="http://schemas.openxmlformats.org/presentationml/2006/main">
   <p:cSld>
     <p:spTree>
@@ -6769,10 +6837,20 @@
   <p:clrMapOvr>
     <a:masterClrMapping/>
   </p:clrMapOvr>
+  <p:transition>
+    <p:wheel spokes="8"/>
+  </p:transition>
+  <p:timing>
+    <p:tnLst>
+      <p:par>
+        <p:cTn id="1" dur="indefinite" restart="never" nodeType="tmRoot"/>
+      </p:par>
+    </p:tnLst>
+  </p:timing>
 </p:sld>
 </file>
 
-<file path=ppt/slides/slide21.xml><?xml version="1.0" encoding="utf-8"?>
+<file path=ppt/slides/slide22.xml><?xml version="1.0" encoding="utf-8"?>
 <p:sld xmlns:a="http://schemas.openxmlformats.org/drawingml/2006/main" xmlns:r="http://schemas.openxmlformats.org/officeDocument/2006/relationships" xmlns:p="http://schemas.openxmlformats.org/presentationml/2006/main">
   <p:cSld>
     <p:spTree>
@@ -6910,21 +6988,8 @@
                   <a:schemeClr val="tx1"/>
                 </a:solidFill>
               </a:rPr>
-              <a:t>To  be entered  choice  </a:t>
-            </a:r>
-            <a:r>
-              <a:rPr lang="en-US" sz="1200" dirty="0" smtClean="0">
-                <a:solidFill>
-                  <a:schemeClr val="tx1"/>
-                </a:solidFill>
-              </a:rPr>
-              <a:t>wrongly</a:t>
-            </a:r>
-            <a:endParaRPr lang="en-US" sz="1200" dirty="0" smtClean="0">
-              <a:solidFill>
-                <a:schemeClr val="tx1"/>
-              </a:solidFill>
-            </a:endParaRPr>
+              <a:t>To  be entered  choice  wrongly</a:t>
+            </a:r>
           </a:p>
         </p:txBody>
       </p:sp>
@@ -6985,29 +7050,8 @@
                   <a:schemeClr val="tx1"/>
                 </a:solidFill>
               </a:rPr>
-              <a:t>To  be entered </a:t>
-            </a:r>
-            <a:r>
-              <a:rPr lang="en-US" sz="1200" dirty="0" smtClean="0">
-                <a:solidFill>
-                  <a:schemeClr val="tx1"/>
-                </a:solidFill>
-              </a:rPr>
-              <a:t> username and password </a:t>
-            </a:r>
-            <a:r>
-              <a:rPr lang="en-US" sz="1200" dirty="0" smtClean="0">
-                <a:solidFill>
-                  <a:schemeClr val="tx1"/>
-                </a:solidFill>
-              </a:rPr>
-              <a:t>wrongly</a:t>
-            </a:r>
-            <a:endParaRPr lang="en-US" sz="1200" dirty="0" smtClean="0">
-              <a:solidFill>
-                <a:schemeClr val="tx1"/>
-              </a:solidFill>
-            </a:endParaRPr>
+              <a:t>To  be entered  username and password wrongly</a:t>
+            </a:r>
           </a:p>
         </p:txBody>
       </p:sp>
@@ -7068,15 +7112,7 @@
                   <a:schemeClr val="tx1"/>
                 </a:solidFill>
               </a:rPr>
-              <a:t>Error  </a:t>
-            </a:r>
-            <a:r>
-              <a:rPr lang="en-US" sz="1200" dirty="0" smtClean="0">
-                <a:solidFill>
-                  <a:schemeClr val="tx1"/>
-                </a:solidFill>
-              </a:rPr>
-              <a:t>message</a:t>
+              <a:t>Error  message</a:t>
             </a:r>
             <a:endParaRPr lang="en-US" sz="1200" dirty="0">
               <a:solidFill>
@@ -7091,10 +7127,20 @@
   <p:clrMapOvr>
     <a:masterClrMapping/>
   </p:clrMapOvr>
+  <p:transition>
+    <p:wheel spokes="8"/>
+  </p:transition>
+  <p:timing>
+    <p:tnLst>
+      <p:par>
+        <p:cTn id="1" dur="indefinite" restart="never" nodeType="tmRoot"/>
+      </p:par>
+    </p:tnLst>
+  </p:timing>
 </p:sld>
 </file>
 
-<file path=ppt/slides/slide22.xml><?xml version="1.0" encoding="utf-8"?>
+<file path=ppt/slides/slide23.xml><?xml version="1.0" encoding="utf-8"?>
 <p:sld xmlns:a="http://schemas.openxmlformats.org/drawingml/2006/main" xmlns:r="http://schemas.openxmlformats.org/officeDocument/2006/relationships" xmlns:p="http://schemas.openxmlformats.org/presentationml/2006/main">
   <p:cSld>
     <p:spTree>
@@ -7294,15 +7340,7 @@
                   <a:schemeClr val="tx1"/>
                 </a:solidFill>
               </a:rPr>
-              <a:t>Error  </a:t>
-            </a:r>
-            <a:r>
-              <a:rPr lang="en-US" sz="1200" dirty="0" smtClean="0">
-                <a:solidFill>
-                  <a:schemeClr val="tx1"/>
-                </a:solidFill>
-              </a:rPr>
-              <a:t>message</a:t>
+              <a:t>Error  message</a:t>
             </a:r>
             <a:endParaRPr lang="en-US" sz="1200" dirty="0">
               <a:solidFill>
@@ -7317,10 +7355,20 @@
   <p:clrMapOvr>
     <a:masterClrMapping/>
   </p:clrMapOvr>
+  <p:transition>
+    <p:wheel spokes="8"/>
+  </p:transition>
+  <p:timing>
+    <p:tnLst>
+      <p:par>
+        <p:cTn id="1" dur="indefinite" restart="never" nodeType="tmRoot"/>
+      </p:par>
+    </p:tnLst>
+  </p:timing>
 </p:sld>
 </file>
 
-<file path=ppt/slides/slide23.xml><?xml version="1.0" encoding="utf-8"?>
+<file path=ppt/slides/slide24.xml><?xml version="1.0" encoding="utf-8"?>
 <p:sld xmlns:a="http://schemas.openxmlformats.org/drawingml/2006/main" xmlns:r="http://schemas.openxmlformats.org/officeDocument/2006/relationships" xmlns:p="http://schemas.openxmlformats.org/presentationml/2006/main">
   <p:cSld>
     <p:spTree>
@@ -7458,15 +7506,7 @@
                   <a:schemeClr val="tx1"/>
                 </a:solidFill>
               </a:rPr>
-              <a:t>insufficient </a:t>
-            </a:r>
-            <a:r>
-              <a:rPr lang="en-US" sz="1200" dirty="0" smtClean="0">
-                <a:solidFill>
-                  <a:schemeClr val="tx1"/>
-                </a:solidFill>
-              </a:rPr>
-              <a:t>message</a:t>
+              <a:t>insufficient message</a:t>
             </a:r>
             <a:endParaRPr lang="en-US" sz="1200" dirty="0">
               <a:solidFill>
@@ -7481,10 +7521,20 @@
   <p:clrMapOvr>
     <a:masterClrMapping/>
   </p:clrMapOvr>
+  <p:transition>
+    <p:wheel spokes="8"/>
+  </p:transition>
+  <p:timing>
+    <p:tnLst>
+      <p:par>
+        <p:cTn id="1" dur="indefinite" restart="never" nodeType="tmRoot"/>
+      </p:par>
+    </p:tnLst>
+  </p:timing>
 </p:sld>
 </file>
 
-<file path=ppt/slides/slide24.xml><?xml version="1.0" encoding="utf-8"?>
+<file path=ppt/slides/slide25.xml><?xml version="1.0" encoding="utf-8"?>
 <p:sld xmlns:a="http://schemas.openxmlformats.org/drawingml/2006/main" xmlns:r="http://schemas.openxmlformats.org/officeDocument/2006/relationships" xmlns:p="http://schemas.openxmlformats.org/presentationml/2006/main">
   <p:cSld>
     <p:spTree>
@@ -7622,23 +7672,7 @@
                   <a:schemeClr val="tx1"/>
                 </a:solidFill>
               </a:rPr>
-              <a:t>logout</a:t>
-            </a:r>
-            <a:r>
-              <a:rPr lang="en-US" sz="1200" dirty="0" smtClean="0">
-                <a:solidFill>
-                  <a:schemeClr val="tx1"/>
-                </a:solidFill>
-              </a:rPr>
-              <a:t> </a:t>
-            </a:r>
-            <a:r>
-              <a:rPr lang="en-US" sz="1200" dirty="0" smtClean="0">
-                <a:solidFill>
-                  <a:schemeClr val="tx1"/>
-                </a:solidFill>
-              </a:rPr>
-              <a:t>message</a:t>
+              <a:t>logout message</a:t>
             </a:r>
             <a:endParaRPr lang="en-US" sz="1200" dirty="0">
               <a:solidFill>
@@ -7653,99 +7687,16 @@
   <p:clrMapOvr>
     <a:masterClrMapping/>
   </p:clrMapOvr>
-</p:sld>
-</file>
-
-<file path=ppt/slides/slide25.xml><?xml version="1.0" encoding="utf-8"?>
-<p:sld xmlns:a="http://schemas.openxmlformats.org/drawingml/2006/main" xmlns:r="http://schemas.openxmlformats.org/officeDocument/2006/relationships" xmlns:p="http://schemas.openxmlformats.org/presentationml/2006/main">
-  <p:cSld>
-    <p:spTree>
-      <p:nvGrpSpPr>
-        <p:cNvPr id="1" name=""/>
-        <p:cNvGrpSpPr/>
-        <p:nvPr/>
-      </p:nvGrpSpPr>
-      <p:grpSpPr>
-        <a:xfrm>
-          <a:off x="0" y="0"/>
-          <a:ext cx="0" cy="0"/>
-          <a:chOff x="0" y="0"/>
-          <a:chExt cx="0" cy="0"/>
-        </a:xfrm>
-      </p:grpSpPr>
-      <p:sp>
-        <p:nvSpPr>
-          <p:cNvPr id="2" name="Title 1"/>
-          <p:cNvSpPr>
-            <a:spLocks noGrp="1"/>
-          </p:cNvSpPr>
-          <p:nvPr>
-            <p:ph type="title"/>
-          </p:nvPr>
-        </p:nvSpPr>
-        <p:spPr/>
-        <p:txBody>
-          <a:bodyPr/>
-          <a:lstStyle/>
-          <a:p>
-            <a:pPr algn="ctr"/>
-            <a:r>
-              <a:rPr lang="en-US" sz="4800" dirty="0" smtClean="0">
-                <a:solidFill>
-                  <a:srgbClr val="C00000"/>
-                </a:solidFill>
-                <a:latin typeface="Algerian" pitchFamily="82" charset="0"/>
-              </a:rPr>
-              <a:t>advantage</a:t>
-            </a:r>
-            <a:endParaRPr lang="en-US" dirty="0"/>
-          </a:p>
-        </p:txBody>
-      </p:sp>
-      <p:sp>
-        <p:nvSpPr>
-          <p:cNvPr id="3" name="Content Placeholder 2"/>
-          <p:cNvSpPr>
-            <a:spLocks noGrp="1"/>
-          </p:cNvSpPr>
-          <p:nvPr>
-            <p:ph idx="1"/>
-          </p:nvPr>
-        </p:nvSpPr>
-        <p:spPr/>
-        <p:txBody>
-          <a:bodyPr/>
-          <a:lstStyle/>
-          <a:p>
-            <a:pPr>
-              <a:buClrTx/>
-              <a:buFont typeface="Wingdings" pitchFamily="2" charset="2"/>
-              <a:buChar char="Ø"/>
-            </a:pPr>
-            <a:r>
-              <a:rPr lang="en-US" dirty="0" smtClean="0"/>
-              <a:t>Easy to operate.</a:t>
-            </a:r>
-          </a:p>
-          <a:p>
-            <a:pPr>
-              <a:buClrTx/>
-              <a:buFont typeface="Wingdings" pitchFamily="2" charset="2"/>
-              <a:buChar char="Ø"/>
-            </a:pPr>
-            <a:r>
-              <a:rPr lang="en-US" dirty="0" smtClean="0"/>
-              <a:t>Using simply some classes, objects, functions, etc.</a:t>
-            </a:r>
-            <a:endParaRPr lang="en-US" dirty="0"/>
-          </a:p>
-        </p:txBody>
-      </p:sp>
-    </p:spTree>
-  </p:cSld>
-  <p:clrMapOvr>
-    <a:masterClrMapping/>
-  </p:clrMapOvr>
+  <p:transition>
+    <p:wheel spokes="8"/>
+  </p:transition>
+  <p:timing>
+    <p:tnLst>
+      <p:par>
+        <p:cTn id="1" dur="indefinite" restart="never" nodeType="tmRoot"/>
+      </p:par>
+    </p:tnLst>
+  </p:timing>
 </p:sld>
 </file>
 
@@ -7789,7 +7740,7 @@
                 </a:solidFill>
                 <a:latin typeface="Algerian" pitchFamily="82" charset="0"/>
               </a:rPr>
-              <a:t>conclusion</a:t>
+              <a:t>advantage</a:t>
             </a:r>
             <a:endParaRPr lang="en-US" dirty="0"/>
           </a:p>
@@ -7817,7 +7768,18 @@
             </a:pPr>
             <a:r>
               <a:rPr lang="en-US" dirty="0" smtClean="0"/>
-              <a:t>This project is developed to nature the needs of a user in a banking sector by embedding all the tasks of transactions taking place in a bank.</a:t>
+              <a:t>Easy to operate.</a:t>
+            </a:r>
+          </a:p>
+          <a:p>
+            <a:pPr>
+              <a:buClrTx/>
+              <a:buFont typeface="Wingdings" pitchFamily="2" charset="2"/>
+              <a:buChar char="Ø"/>
+            </a:pPr>
+            <a:r>
+              <a:rPr lang="en-US" dirty="0" smtClean="0"/>
+              <a:t>Using simply some classes, objects, functions, etc.</a:t>
             </a:r>
             <a:endParaRPr lang="en-US" dirty="0"/>
           </a:p>
@@ -7828,10 +7790,112 @@
   <p:clrMapOvr>
     <a:masterClrMapping/>
   </p:clrMapOvr>
+  <p:transition>
+    <p:wheel spokes="8"/>
+  </p:transition>
+  <p:timing>
+    <p:tnLst>
+      <p:par>
+        <p:cTn id="1" dur="indefinite" restart="never" nodeType="tmRoot"/>
+      </p:par>
+    </p:tnLst>
+  </p:timing>
 </p:sld>
 </file>
 
 <file path=ppt/slides/slide27.xml><?xml version="1.0" encoding="utf-8"?>
+<p:sld xmlns:a="http://schemas.openxmlformats.org/drawingml/2006/main" xmlns:r="http://schemas.openxmlformats.org/officeDocument/2006/relationships" xmlns:p="http://schemas.openxmlformats.org/presentationml/2006/main">
+  <p:cSld>
+    <p:spTree>
+      <p:nvGrpSpPr>
+        <p:cNvPr id="1" name=""/>
+        <p:cNvGrpSpPr/>
+        <p:nvPr/>
+      </p:nvGrpSpPr>
+      <p:grpSpPr>
+        <a:xfrm>
+          <a:off x="0" y="0"/>
+          <a:ext cx="0" cy="0"/>
+          <a:chOff x="0" y="0"/>
+          <a:chExt cx="0" cy="0"/>
+        </a:xfrm>
+      </p:grpSpPr>
+      <p:sp>
+        <p:nvSpPr>
+          <p:cNvPr id="2" name="Title 1"/>
+          <p:cNvSpPr>
+            <a:spLocks noGrp="1"/>
+          </p:cNvSpPr>
+          <p:nvPr>
+            <p:ph type="title"/>
+          </p:nvPr>
+        </p:nvSpPr>
+        <p:spPr/>
+        <p:txBody>
+          <a:bodyPr/>
+          <a:lstStyle/>
+          <a:p>
+            <a:pPr algn="ctr"/>
+            <a:r>
+              <a:rPr lang="en-US" sz="4800" dirty="0" smtClean="0">
+                <a:solidFill>
+                  <a:srgbClr val="C00000"/>
+                </a:solidFill>
+                <a:latin typeface="Algerian" pitchFamily="82" charset="0"/>
+              </a:rPr>
+              <a:t>conclusion</a:t>
+            </a:r>
+            <a:endParaRPr lang="en-US" dirty="0"/>
+          </a:p>
+        </p:txBody>
+      </p:sp>
+      <p:sp>
+        <p:nvSpPr>
+          <p:cNvPr id="3" name="Content Placeholder 2"/>
+          <p:cNvSpPr>
+            <a:spLocks noGrp="1"/>
+          </p:cNvSpPr>
+          <p:nvPr>
+            <p:ph idx="1"/>
+          </p:nvPr>
+        </p:nvSpPr>
+        <p:spPr/>
+        <p:txBody>
+          <a:bodyPr/>
+          <a:lstStyle/>
+          <a:p>
+            <a:pPr>
+              <a:buClrTx/>
+              <a:buFont typeface="Wingdings" pitchFamily="2" charset="2"/>
+              <a:buChar char="Ø"/>
+            </a:pPr>
+            <a:r>
+              <a:rPr lang="en-US" dirty="0" smtClean="0"/>
+              <a:t>This project is developed to nature the needs of a user in a banking sector by embedding all the tasks of transactions taking place in a bank.</a:t>
+            </a:r>
+            <a:endParaRPr lang="en-US" dirty="0"/>
+          </a:p>
+        </p:txBody>
+      </p:sp>
+    </p:spTree>
+  </p:cSld>
+  <p:clrMapOvr>
+    <a:masterClrMapping/>
+  </p:clrMapOvr>
+  <p:transition>
+    <p:wheel spokes="8"/>
+  </p:transition>
+  <p:timing>
+    <p:tnLst>
+      <p:par>
+        <p:cTn id="1" dur="indefinite" restart="never" nodeType="tmRoot"/>
+      </p:par>
+    </p:tnLst>
+  </p:timing>
+</p:sld>
+</file>
+
+<file path=ppt/slides/slide28.xml><?xml version="1.0" encoding="utf-8"?>
 <p:sld xmlns:a="http://schemas.openxmlformats.org/drawingml/2006/main" xmlns:r="http://schemas.openxmlformats.org/officeDocument/2006/relationships" xmlns:p="http://schemas.openxmlformats.org/presentationml/2006/main">
   <p:cSld>
     <p:spTree>
@@ -7884,6 +7948,16 @@
   <p:clrMapOvr>
     <a:masterClrMapping/>
   </p:clrMapOvr>
+  <p:transition>
+    <p:wheel spokes="8"/>
+  </p:transition>
+  <p:timing>
+    <p:tnLst>
+      <p:par>
+        <p:cTn id="1" dur="indefinite" restart="never" nodeType="tmRoot"/>
+      </p:par>
+    </p:tnLst>
+  </p:timing>
 </p:sld>
 </file>
 
@@ -8005,6 +8079,9 @@
   <p:clrMapOvr>
     <a:masterClrMapping/>
   </p:clrMapOvr>
+  <p:transition>
+    <p:wheel spokes="8"/>
+  </p:transition>
   <p:timing>
     <p:tnLst>
       <p:par>
@@ -8099,6 +8176,16 @@
   <p:clrMapOvr>
     <a:masterClrMapping/>
   </p:clrMapOvr>
+  <p:transition>
+    <p:wheel spokes="8"/>
+  </p:transition>
+  <p:timing>
+    <p:tnLst>
+      <p:par>
+        <p:cTn id="1" dur="indefinite" restart="never" nodeType="tmRoot"/>
+      </p:par>
+    </p:tnLst>
+  </p:timing>
 </p:sld>
 </file>
 
@@ -8192,6 +8279,16 @@
   <p:clrMapOvr>
     <a:masterClrMapping/>
   </p:clrMapOvr>
+  <p:transition>
+    <p:wheel spokes="8"/>
+  </p:transition>
+  <p:timing>
+    <p:tnLst>
+      <p:par>
+        <p:cTn id="1" dur="indefinite" restart="never" nodeType="tmRoot"/>
+      </p:par>
+    </p:tnLst>
+  </p:timing>
 </p:sld>
 </file>
 
@@ -8296,6 +8393,16 @@
   <p:clrMapOvr>
     <a:masterClrMapping/>
   </p:clrMapOvr>
+  <p:transition>
+    <p:wheel spokes="8"/>
+  </p:transition>
+  <p:timing>
+    <p:tnLst>
+      <p:par>
+        <p:cTn id="1" dur="indefinite" restart="never" nodeType="tmRoot"/>
+      </p:par>
+    </p:tnLst>
+  </p:timing>
 </p:sld>
 </file>
 
@@ -8369,11 +8476,7 @@
             </a:pPr>
             <a:r>
               <a:rPr lang="en-US" dirty="0" smtClean="0"/>
-              <a:t>Mani </a:t>
-            </a:r>
-            <a:r>
-              <a:rPr lang="en-US" dirty="0" smtClean="0"/>
-              <a:t>Menu</a:t>
+              <a:t>Mani Menu</a:t>
             </a:r>
           </a:p>
           <a:p>
@@ -8395,11 +8498,7 @@
             </a:pPr>
             <a:r>
               <a:rPr lang="en-US" dirty="0" smtClean="0"/>
-              <a:t>2.Login </a:t>
-            </a:r>
-            <a:r>
-              <a:rPr lang="en-US" dirty="0" smtClean="0"/>
-              <a:t>account</a:t>
+              <a:t>2.Login account</a:t>
             </a:r>
           </a:p>
           <a:p>
@@ -8412,7 +8511,6 @@
               <a:rPr lang="en-US" dirty="0" smtClean="0"/>
               <a:t>3.Delete account</a:t>
             </a:r>
-            <a:endParaRPr lang="en-US" dirty="0" smtClean="0"/>
           </a:p>
           <a:p>
             <a:pPr>
@@ -8488,6 +8586,16 @@
   <p:clrMapOvr>
     <a:masterClrMapping/>
   </p:clrMapOvr>
+  <p:transition>
+    <p:wheel spokes="8"/>
+  </p:transition>
+  <p:timing>
+    <p:tnLst>
+      <p:par>
+        <p:cTn id="1" dur="indefinite" restart="never" nodeType="tmRoot"/>
+      </p:par>
+    </p:tnLst>
+  </p:timing>
 </p:sld>
 </file>
 
@@ -8581,6 +8689,16 @@
   <p:clrMapOvr>
     <a:masterClrMapping/>
   </p:clrMapOvr>
+  <p:transition>
+    <p:wheel spokes="8"/>
+  </p:transition>
+  <p:timing>
+    <p:tnLst>
+      <p:par>
+        <p:cTn id="1" dur="indefinite" restart="never" nodeType="tmRoot"/>
+      </p:par>
+    </p:tnLst>
+  </p:timing>
 </p:sld>
 </file>
 
@@ -8672,6 +8790,16 @@
   <p:clrMapOvr>
     <a:masterClrMapping/>
   </p:clrMapOvr>
+  <p:transition>
+    <p:wheel spokes="8"/>
+  </p:transition>
+  <p:timing>
+    <p:tnLst>
+      <p:par>
+        <p:cTn id="1" dur="indefinite" restart="never" nodeType="tmRoot"/>
+      </p:par>
+    </p:tnLst>
+  </p:timing>
 </p:sld>
 </file>
 

</xml_diff>